<commit_message>
Øhh, test for manglede kode
</commit_message>
<xml_diff>
--- a/Myrestartskaerm.pptx
+++ b/Myrestartskaerm.pptx
@@ -259,7 +259,7 @@
           <a:p>
             <a:fld id="{A476F14B-F7E0-4BB8-BEDF-B5AB8B27A77B}" type="datetimeFigureOut">
               <a:rPr lang="da-DK" smtClean="0"/>
-              <a:t>15-09-2022</a:t>
+              <a:t>16-09-2022</a:t>
             </a:fld>
             <a:endParaRPr lang="da-DK"/>
           </a:p>
@@ -429,7 +429,7 @@
           <a:p>
             <a:fld id="{A476F14B-F7E0-4BB8-BEDF-B5AB8B27A77B}" type="datetimeFigureOut">
               <a:rPr lang="da-DK" smtClean="0"/>
-              <a:t>15-09-2022</a:t>
+              <a:t>16-09-2022</a:t>
             </a:fld>
             <a:endParaRPr lang="da-DK"/>
           </a:p>
@@ -609,7 +609,7 @@
           <a:p>
             <a:fld id="{A476F14B-F7E0-4BB8-BEDF-B5AB8B27A77B}" type="datetimeFigureOut">
               <a:rPr lang="da-DK" smtClean="0"/>
-              <a:t>15-09-2022</a:t>
+              <a:t>16-09-2022</a:t>
             </a:fld>
             <a:endParaRPr lang="da-DK"/>
           </a:p>
@@ -779,7 +779,7 @@
           <a:p>
             <a:fld id="{A476F14B-F7E0-4BB8-BEDF-B5AB8B27A77B}" type="datetimeFigureOut">
               <a:rPr lang="da-DK" smtClean="0"/>
-              <a:t>15-09-2022</a:t>
+              <a:t>16-09-2022</a:t>
             </a:fld>
             <a:endParaRPr lang="da-DK"/>
           </a:p>
@@ -1025,7 +1025,7 @@
           <a:p>
             <a:fld id="{A476F14B-F7E0-4BB8-BEDF-B5AB8B27A77B}" type="datetimeFigureOut">
               <a:rPr lang="da-DK" smtClean="0"/>
-              <a:t>15-09-2022</a:t>
+              <a:t>16-09-2022</a:t>
             </a:fld>
             <a:endParaRPr lang="da-DK"/>
           </a:p>
@@ -1257,7 +1257,7 @@
           <a:p>
             <a:fld id="{A476F14B-F7E0-4BB8-BEDF-B5AB8B27A77B}" type="datetimeFigureOut">
               <a:rPr lang="da-DK" smtClean="0"/>
-              <a:t>15-09-2022</a:t>
+              <a:t>16-09-2022</a:t>
             </a:fld>
             <a:endParaRPr lang="da-DK"/>
           </a:p>
@@ -1624,7 +1624,7 @@
           <a:p>
             <a:fld id="{A476F14B-F7E0-4BB8-BEDF-B5AB8B27A77B}" type="datetimeFigureOut">
               <a:rPr lang="da-DK" smtClean="0"/>
-              <a:t>15-09-2022</a:t>
+              <a:t>16-09-2022</a:t>
             </a:fld>
             <a:endParaRPr lang="da-DK"/>
           </a:p>
@@ -1742,7 +1742,7 @@
           <a:p>
             <a:fld id="{A476F14B-F7E0-4BB8-BEDF-B5AB8B27A77B}" type="datetimeFigureOut">
               <a:rPr lang="da-DK" smtClean="0"/>
-              <a:t>15-09-2022</a:t>
+              <a:t>16-09-2022</a:t>
             </a:fld>
             <a:endParaRPr lang="da-DK"/>
           </a:p>
@@ -1837,7 +1837,7 @@
           <a:p>
             <a:fld id="{A476F14B-F7E0-4BB8-BEDF-B5AB8B27A77B}" type="datetimeFigureOut">
               <a:rPr lang="da-DK" smtClean="0"/>
-              <a:t>15-09-2022</a:t>
+              <a:t>16-09-2022</a:t>
             </a:fld>
             <a:endParaRPr lang="da-DK"/>
           </a:p>
@@ -2114,7 +2114,7 @@
           <a:p>
             <a:fld id="{A476F14B-F7E0-4BB8-BEDF-B5AB8B27A77B}" type="datetimeFigureOut">
               <a:rPr lang="da-DK" smtClean="0"/>
-              <a:t>15-09-2022</a:t>
+              <a:t>16-09-2022</a:t>
             </a:fld>
             <a:endParaRPr lang="da-DK"/>
           </a:p>
@@ -2371,7 +2371,7 @@
           <a:p>
             <a:fld id="{A476F14B-F7E0-4BB8-BEDF-B5AB8B27A77B}" type="datetimeFigureOut">
               <a:rPr lang="da-DK" smtClean="0"/>
-              <a:t>15-09-2022</a:t>
+              <a:t>16-09-2022</a:t>
             </a:fld>
             <a:endParaRPr lang="da-DK"/>
           </a:p>
@@ -2584,7 +2584,7 @@
           <a:p>
             <a:fld id="{A476F14B-F7E0-4BB8-BEDF-B5AB8B27A77B}" type="datetimeFigureOut">
               <a:rPr lang="da-DK" smtClean="0"/>
-              <a:t>15-09-2022</a:t>
+              <a:t>16-09-2022</a:t>
             </a:fld>
             <a:endParaRPr lang="da-DK"/>
           </a:p>
@@ -4488,8 +4488,8 @@
         </p:nvSpPr>
         <p:spPr>
           <a:xfrm>
-            <a:off x="3500120" y="3095916"/>
-            <a:ext cx="5440680" cy="1077218"/>
+            <a:off x="4492948" y="2790469"/>
+            <a:ext cx="4659519" cy="1569660"/>
           </a:xfrm>
           <a:prstGeom prst="rect">
             <a:avLst/>
@@ -4506,15 +4506,7 @@
               <a:rPr lang="da-DK" sz="3200" b="1" dirty="0">
                 <a:latin typeface="Ant" panose="02000600000000000000" pitchFamily="50" charset="0"/>
               </a:rPr>
-              <a:t>FA DET RIGTIGE SKRALD NED I </a:t>
-            </a:r>
-          </a:p>
-          <a:p>
-            <a:r>
-              <a:rPr lang="da-DK" sz="3200" b="1" dirty="0">
-                <a:latin typeface="Ant" panose="02000600000000000000" pitchFamily="50" charset="0"/>
-              </a:rPr>
-              <a:t>DEN RIGTIGE SKRALDESPAND</a:t>
+              <a:t>FOR AT FINDE HVILKET SKRALD HORE TIL HVILKEN SPAND KLIK PA</a:t>
             </a:r>
           </a:p>
         </p:txBody>
@@ -4533,7 +4525,7 @@
         </p:nvSpPr>
         <p:spPr>
           <a:xfrm rot="5400000">
-            <a:off x="3590349" y="3146528"/>
+            <a:off x="6773504" y="3809764"/>
             <a:ext cx="629047" cy="382786"/>
           </a:xfrm>
           <a:prstGeom prst="rect">
@@ -4582,7 +4574,7 @@
         </p:nvSpPr>
         <p:spPr>
           <a:xfrm>
-            <a:off x="4174067" y="4745254"/>
+            <a:off x="-1186780" y="4876197"/>
             <a:ext cx="3600000" cy="1440000"/>
           </a:xfrm>
           <a:prstGeom prst="roundRect">
@@ -4654,7 +4646,7 @@
         </p:nvSpPr>
         <p:spPr>
           <a:xfrm rot="5400000">
-            <a:off x="6616266" y="5105254"/>
+            <a:off x="1255419" y="5236197"/>
             <a:ext cx="720000" cy="720000"/>
           </a:xfrm>
           <a:prstGeom prst="triangle">
@@ -4761,6 +4753,91 @@
             </a:r>
             <a:endParaRPr lang="da-DK" sz="9313" b="1" dirty="0">
               <a:latin typeface="Ant" panose="02000600000000000000" pitchFamily="50" charset="0"/>
+            </a:endParaRPr>
+          </a:p>
+        </p:txBody>
+      </p:sp>
+      <p:pic>
+        <p:nvPicPr>
+          <p:cNvPr id="4" name="Billede 3" descr="Et billede, der indeholder tekst, skilt&#10;&#10;Automatisk genereret beskrivelse">
+            <a:extLst>
+              <a:ext uri="{FF2B5EF4-FFF2-40B4-BE49-F238E27FC236}">
+                <a16:creationId xmlns:a16="http://schemas.microsoft.com/office/drawing/2014/main" id="{14EF4BE0-4B48-4CE8-60EC-3566ABE0DF5C}"/>
+              </a:ext>
+            </a:extLst>
+          </p:cNvPr>
+          <p:cNvPicPr>
+            <a:picLocks noChangeAspect="1"/>
+          </p:cNvPicPr>
+          <p:nvPr/>
+        </p:nvPicPr>
+        <p:blipFill>
+          <a:blip r:embed="rId2">
+            <a:extLst>
+              <a:ext uri="{28A0092B-C50C-407E-A947-70E740481C1C}">
+                <a14:useLocalDpi xmlns:a14="http://schemas.microsoft.com/office/drawing/2010/main" val="0"/>
+              </a:ext>
+            </a:extLst>
+          </a:blip>
+          <a:stretch>
+            <a:fillRect/>
+          </a:stretch>
+        </p:blipFill>
+        <p:spPr>
+          <a:xfrm>
+            <a:off x="7336266" y="3798790"/>
+            <a:ext cx="529692" cy="516891"/>
+          </a:xfrm>
+          <a:prstGeom prst="rect">
+            <a:avLst/>
+          </a:prstGeom>
+        </p:spPr>
+      </p:pic>
+      <p:sp>
+        <p:nvSpPr>
+          <p:cNvPr id="7" name="Tekstfelt 6">
+            <a:extLst>
+              <a:ext uri="{FF2B5EF4-FFF2-40B4-BE49-F238E27FC236}">
+                <a16:creationId xmlns:a16="http://schemas.microsoft.com/office/drawing/2014/main" id="{FD44180B-4419-556A-D348-472E202DEEF2}"/>
+              </a:ext>
+            </a:extLst>
+          </p:cNvPr>
+          <p:cNvSpPr txBox="1"/>
+          <p:nvPr/>
+        </p:nvSpPr>
+        <p:spPr>
+          <a:xfrm rot="1907924">
+            <a:off x="6170425" y="3464483"/>
+            <a:ext cx="629047" cy="461665"/>
+          </a:xfrm>
+          <a:prstGeom prst="rect">
+            <a:avLst/>
+          </a:prstGeom>
+          <a:noFill/>
+        </p:spPr>
+        <p:txBody>
+          <a:bodyPr wrap="square">
+            <a:spAutoFit/>
+          </a:bodyPr>
+          <a:lstStyle/>
+          <a:p>
+            <a:r>
+              <a:rPr lang="da-DK" sz="2400" b="1" dirty="0">
+                <a:ln>
+                  <a:solidFill>
+                    <a:schemeClr val="tx1"/>
+                  </a:solidFill>
+                </a:ln>
+                <a:latin typeface="Ant" panose="02000600000000000000" pitchFamily="50" charset="0"/>
+              </a:rPr>
+              <a:t>I</a:t>
+            </a:r>
+            <a:endParaRPr lang="da-DK" sz="2400" b="1" dirty="0">
+              <a:ln>
+                <a:solidFill>
+                  <a:schemeClr val="tx1"/>
+                </a:solidFill>
+              </a:ln>
             </a:endParaRPr>
           </a:p>
         </p:txBody>

</xml_diff>